<commit_message>
Added More Intergration to Azure
</commit_message>
<xml_diff>
--- a/Cloud Native Development.pptx
+++ b/Cloud Native Development.pptx
@@ -14,6 +14,7 @@
     <p:sldId id="261" r:id="rId8"/>
     <p:sldId id="262" r:id="rId9"/>
     <p:sldId id="263" r:id="rId10"/>
+    <p:sldId id="265" r:id="rId11"/>
   </p:sldIdLst>
   <p:sldSz cx="12192000" cy="6858000"/>
   <p:notesSz cx="6858000" cy="9144000"/>
@@ -3843,6 +3844,145 @@
 </p:sld>
 </file>
 
+<file path=ppt/slides/slide10.xml><?xml version="1.0" encoding="utf-8"?>
+<p:sld xmlns:a="http://schemas.openxmlformats.org/drawingml/2006/main" xmlns:r="http://schemas.openxmlformats.org/officeDocument/2006/relationships" xmlns:p="http://schemas.openxmlformats.org/presentationml/2006/main">
+  <p:cSld>
+    <p:spTree>
+      <p:nvGrpSpPr>
+        <p:cNvPr id="1" name=""/>
+        <p:cNvGrpSpPr/>
+        <p:nvPr/>
+      </p:nvGrpSpPr>
+      <p:grpSpPr>
+        <a:xfrm>
+          <a:off x="0" y="0"/>
+          <a:ext cx="0" cy="0"/>
+          <a:chOff x="0" y="0"/>
+          <a:chExt cx="0" cy="0"/>
+        </a:xfrm>
+      </p:grpSpPr>
+      <p:sp>
+        <p:nvSpPr>
+          <p:cNvPr id="2" name="Title 1">
+            <a:extLst>
+              <a:ext uri="{FF2B5EF4-FFF2-40B4-BE49-F238E27FC236}">
+                <a16:creationId xmlns:a16="http://schemas.microsoft.com/office/drawing/2014/main" id="{25B1398F-6C31-4D1D-9279-A6E8FE4D88B8}"/>
+              </a:ext>
+            </a:extLst>
+          </p:cNvPr>
+          <p:cNvSpPr>
+            <a:spLocks noGrp="1"/>
+          </p:cNvSpPr>
+          <p:nvPr>
+            <p:ph type="title"/>
+          </p:nvPr>
+        </p:nvSpPr>
+        <p:spPr/>
+        <p:txBody>
+          <a:bodyPr>
+            <a:normAutofit/>
+          </a:bodyPr>
+          <a:lstStyle/>
+          <a:p>
+            <a:r>
+              <a:rPr lang="en-GB" sz="2400" dirty="0">
+                <a:latin typeface="Arial" panose="020B0604020202020204" pitchFamily="34" charset="0"/>
+                <a:cs typeface="Arial" panose="020B0604020202020204" pitchFamily="34" charset="0"/>
+              </a:rPr>
+              <a:t>TO DO LIST. Wednesday	</a:t>
+            </a:r>
+            <a:endParaRPr lang="en-US" sz="2400" dirty="0">
+              <a:latin typeface="Arial" panose="020B0604020202020204" pitchFamily="34" charset="0"/>
+              <a:cs typeface="Arial" panose="020B0604020202020204" pitchFamily="34" charset="0"/>
+            </a:endParaRPr>
+          </a:p>
+        </p:txBody>
+      </p:sp>
+      <p:sp>
+        <p:nvSpPr>
+          <p:cNvPr id="3" name="Content Placeholder 2">
+            <a:extLst>
+              <a:ext uri="{FF2B5EF4-FFF2-40B4-BE49-F238E27FC236}">
+                <a16:creationId xmlns:a16="http://schemas.microsoft.com/office/drawing/2014/main" id="{9E42281A-11C2-467D-B1E9-F857FFF0E3FF}"/>
+              </a:ext>
+            </a:extLst>
+          </p:cNvPr>
+          <p:cNvSpPr>
+            <a:spLocks noGrp="1"/>
+          </p:cNvSpPr>
+          <p:nvPr>
+            <p:ph idx="1"/>
+          </p:nvPr>
+        </p:nvSpPr>
+        <p:spPr/>
+        <p:txBody>
+          <a:bodyPr/>
+          <a:lstStyle/>
+          <a:p>
+            <a:r>
+              <a:rPr lang="en-GB" dirty="0"/>
+              <a:t>Comment – Create</a:t>
+            </a:r>
+          </a:p>
+          <a:p>
+            <a:r>
+              <a:rPr lang="en-GB" dirty="0"/>
+              <a:t>Post – Update</a:t>
+            </a:r>
+          </a:p>
+          <a:p>
+            <a:r>
+              <a:rPr lang="en-GB" dirty="0"/>
+              <a:t>Full Stack – Complete</a:t>
+            </a:r>
+          </a:p>
+          <a:p>
+            <a:endParaRPr lang="en-GB" dirty="0"/>
+          </a:p>
+          <a:p>
+            <a:r>
+              <a:rPr lang="en-US" sz="1400" dirty="0"/>
+              <a:t>Required for Submission</a:t>
+            </a:r>
+          </a:p>
+          <a:p>
+            <a:r>
+              <a:rPr lang="en-US" sz="1400" dirty="0"/>
+              <a:t>Completed Working Demo</a:t>
+            </a:r>
+          </a:p>
+          <a:p>
+            <a:r>
+              <a:rPr lang="en-US" sz="1400" dirty="0"/>
+              <a:t>Completed Deck</a:t>
+            </a:r>
+            <a:r>
+              <a:rPr lang="en-GB" sz="1400" dirty="0"/>
+              <a:t> </a:t>
+            </a:r>
+          </a:p>
+          <a:p>
+            <a:r>
+              <a:rPr lang="en-GB" sz="1400" dirty="0"/>
+              <a:t>Completed Demo Video</a:t>
+            </a:r>
+            <a:endParaRPr lang="en-US" sz="1400" dirty="0"/>
+          </a:p>
+        </p:txBody>
+      </p:sp>
+    </p:spTree>
+    <p:extLst>
+      <p:ext uri="{BB962C8B-B14F-4D97-AF65-F5344CB8AC3E}">
+        <p14:creationId xmlns:p14="http://schemas.microsoft.com/office/powerpoint/2010/main" val="3560291273"/>
+      </p:ext>
+    </p:extLst>
+  </p:cSld>
+  <p:clrMapOvr>
+    <a:masterClrMapping/>
+  </p:clrMapOvr>
+</p:sld>
+</file>
+
 <file path=ppt/slides/slide2.xml><?xml version="1.0" encoding="utf-8"?>
 <p:sld xmlns:a="http://schemas.openxmlformats.org/drawingml/2006/main" xmlns:r="http://schemas.openxmlformats.org/officeDocument/2006/relationships" xmlns:p="http://schemas.openxmlformats.org/presentationml/2006/main">
   <p:cSld>
@@ -3913,12 +4053,120 @@
             <p:ph idx="1"/>
           </p:nvPr>
         </p:nvSpPr>
-        <p:spPr/>
-        <p:txBody>
-          <a:bodyPr/>
-          <a:lstStyle/>
-          <a:p>
-            <a:endParaRPr lang="en-US"/>
+        <p:spPr>
+          <a:xfrm>
+            <a:off x="838200" y="1253331"/>
+            <a:ext cx="10515600" cy="4351338"/>
+          </a:xfrm>
+        </p:spPr>
+        <p:txBody>
+          <a:bodyPr>
+            <a:normAutofit/>
+          </a:bodyPr>
+          <a:lstStyle/>
+          <a:p>
+            <a:pPr marL="0" indent="0" algn="just">
+              <a:buNone/>
+            </a:pPr>
+            <a:r>
+              <a:rPr lang="en-GB" sz="1400" b="1" u="sng" dirty="0"/>
+              <a:t>Introduction</a:t>
+            </a:r>
+          </a:p>
+          <a:p>
+            <a:pPr marL="0" indent="0" algn="just">
+              <a:buNone/>
+            </a:pPr>
+            <a:r>
+              <a:rPr lang="en-GB" sz="1400" dirty="0"/>
+              <a:t>Within this presentation I will be discussing in dept my solution submitted for the module “cloud native development”. I will discuss the problem, the proposed solution and identification of issues found related to scalability of the web application. At the end of the slide, there is a 5-minute video demonstration of the proposed solution being deployed to Microsoft Azure. Links to the web application can be found here: </a:t>
+            </a:r>
+          </a:p>
+          <a:p>
+            <a:pPr marL="0" indent="0" algn="just">
+              <a:buNone/>
+            </a:pPr>
+            <a:r>
+              <a:rPr lang="en-GB" sz="1400" dirty="0"/>
+              <a:t>	Root Web Application: </a:t>
+            </a:r>
+            <a:r>
+              <a:rPr lang="en-GB" sz="1400" dirty="0">
+                <a:hlinkClick r:id="rId2"/>
+              </a:rPr>
+              <a:t>https://www.google.com</a:t>
+            </a:r>
+            <a:endParaRPr lang="en-GB" sz="1400" dirty="0"/>
+          </a:p>
+          <a:p>
+            <a:pPr marL="0" indent="0" algn="just">
+              <a:buNone/>
+            </a:pPr>
+            <a:r>
+              <a:rPr lang="en-GB" sz="1400" b="1" u="sng" dirty="0"/>
+              <a:t>Problem</a:t>
+            </a:r>
+          </a:p>
+          <a:p>
+            <a:pPr marL="0" indent="0" algn="just">
+              <a:buNone/>
+            </a:pPr>
+            <a:r>
+              <a:rPr lang="en-GB" sz="1400" dirty="0"/>
+              <a:t>As part of the module, I was asked to design and deploy a scalable social media sharing application similarly to Instagram where users will be able to authenticate and post media such as images and videos, write a caption for these media posts and then other users can comment under these posts. Basic Read Write Operations that are expected on such application are the four main Create, Update, Edit and Delete. This allows users to make post and then change or remove them after they have been created. </a:t>
+            </a:r>
+          </a:p>
+          <a:p>
+            <a:pPr marL="0" indent="0" algn="just">
+              <a:buNone/>
+            </a:pPr>
+            <a:r>
+              <a:rPr lang="en-GB" sz="1400" b="1" u="sng" dirty="0"/>
+              <a:t>Proposed Solution</a:t>
+            </a:r>
+          </a:p>
+          <a:p>
+            <a:pPr marL="0" indent="0" algn="just">
+              <a:buNone/>
+            </a:pPr>
+            <a:r>
+              <a:rPr lang="en-GB" sz="1400" dirty="0"/>
+              <a:t>For this solution, I have proposed that I use a cloud-based hosting provider and services, in this case I will be using Microsoft Azure and for scaling of the application I will be using features and services provided by Microsoft azure. The service which are used in this solution are the following: </a:t>
+            </a:r>
+            <a:r>
+              <a:rPr lang="en-GB" sz="1400" b="1" dirty="0"/>
+              <a:t>Azure App Service, Azure Logic Apps</a:t>
+            </a:r>
+            <a:r>
+              <a:rPr lang="en-GB" sz="1400" dirty="0"/>
+              <a:t>. (About 8 have been deployed), </a:t>
+            </a:r>
+            <a:r>
+              <a:rPr lang="en-GB" sz="1400" b="1" dirty="0"/>
+              <a:t>Azure Blob Storage, Azure SQL Database and an Azure CDN</a:t>
+            </a:r>
+            <a:r>
+              <a:rPr lang="en-GB" sz="1400" dirty="0"/>
+              <a:t> (Content Delivery Network). I will discuss in greater detail why I used these, the price of each service, the cost analysis of each service and how that service will aid in the scaling of the web application. I will also discuss any existing limitations of the developed solution and will discuss its ability to scale.	</a:t>
+            </a:r>
+          </a:p>
+          <a:p>
+            <a:pPr marL="0" indent="0" algn="just">
+              <a:buNone/>
+            </a:pPr>
+            <a:endParaRPr lang="en-US" sz="1200" dirty="0"/>
+          </a:p>
+          <a:p>
+            <a:pPr marL="0" indent="0" algn="just">
+              <a:buNone/>
+            </a:pPr>
+            <a:endParaRPr lang="en-US" sz="1200" dirty="0"/>
+          </a:p>
+          <a:p>
+            <a:pPr marL="0" indent="0" algn="just">
+              <a:buNone/>
+            </a:pPr>
+            <a:endParaRPr lang="en-US" sz="1200" dirty="0"/>
           </a:p>
         </p:txBody>
       </p:sp>
@@ -4035,12 +4283,8 @@
           </a:p>
           <a:p>
             <a:r>
-              <a:rPr lang="en-GB"/>
-              <a:t>Cosmos SQL </a:t>
-            </a:r>
-            <a:r>
               <a:rPr lang="en-GB" dirty="0"/>
-              <a:t>DB</a:t>
+              <a:t>Cosmos SQL DB</a:t>
             </a:r>
             <a:endParaRPr lang="en-US" dirty="0"/>
           </a:p>
@@ -4226,7 +4470,23 @@
           <a:bodyPr/>
           <a:lstStyle/>
           <a:p>
-            <a:endParaRPr lang="en-US"/>
+            <a:r>
+              <a:rPr lang="en-GB" dirty="0"/>
+              <a:t>Azure Static Web Apps</a:t>
+            </a:r>
+          </a:p>
+          <a:p>
+            <a:r>
+              <a:rPr lang="en-GB" dirty="0"/>
+              <a:t>Azure CDN (Content Delivery Network)</a:t>
+            </a:r>
+          </a:p>
+          <a:p>
+            <a:r>
+              <a:rPr lang="en-GB" dirty="0"/>
+              <a:t>Azure Logic Apps (6 Total)</a:t>
+            </a:r>
+            <a:endParaRPr lang="en-US" dirty="0"/>
           </a:p>
         </p:txBody>
       </p:sp>

</xml_diff>

<commit_message>
Added more to the power point
</commit_message>
<xml_diff>
--- a/Cloud Native Development.pptx
+++ b/Cloud Native Development.pptx
@@ -7,14 +7,15 @@
   <p:sldIdLst>
     <p:sldId id="256" r:id="rId2"/>
     <p:sldId id="257" r:id="rId3"/>
-    <p:sldId id="264" r:id="rId4"/>
-    <p:sldId id="258" r:id="rId5"/>
-    <p:sldId id="259" r:id="rId6"/>
-    <p:sldId id="260" r:id="rId7"/>
-    <p:sldId id="261" r:id="rId8"/>
-    <p:sldId id="262" r:id="rId9"/>
-    <p:sldId id="263" r:id="rId10"/>
-    <p:sldId id="265" r:id="rId11"/>
+    <p:sldId id="266" r:id="rId4"/>
+    <p:sldId id="267" r:id="rId5"/>
+    <p:sldId id="258" r:id="rId6"/>
+    <p:sldId id="259" r:id="rId7"/>
+    <p:sldId id="260" r:id="rId8"/>
+    <p:sldId id="261" r:id="rId9"/>
+    <p:sldId id="262" r:id="rId10"/>
+    <p:sldId id="263" r:id="rId11"/>
+    <p:sldId id="265" r:id="rId12"/>
   </p:sldIdLst>
   <p:sldSz cx="12192000" cy="6858000"/>
   <p:notesSz cx="6858000" cy="9144000"/>
@@ -268,7 +269,7 @@
           <a:p>
             <a:fld id="{9312FCB0-9AB7-410B-82F0-90816A8324F7}" type="datetimeFigureOut">
               <a:rPr lang="en-US" smtClean="0"/>
-              <a:t>12/7/2021</a:t>
+              <a:t>12/8/21</a:t>
             </a:fld>
             <a:endParaRPr lang="en-US"/>
           </a:p>
@@ -466,7 +467,7 @@
           <a:p>
             <a:fld id="{9312FCB0-9AB7-410B-82F0-90816A8324F7}" type="datetimeFigureOut">
               <a:rPr lang="en-US" smtClean="0"/>
-              <a:t>12/7/2021</a:t>
+              <a:t>12/8/21</a:t>
             </a:fld>
             <a:endParaRPr lang="en-US"/>
           </a:p>
@@ -674,7 +675,7 @@
           <a:p>
             <a:fld id="{9312FCB0-9AB7-410B-82F0-90816A8324F7}" type="datetimeFigureOut">
               <a:rPr lang="en-US" smtClean="0"/>
-              <a:t>12/7/2021</a:t>
+              <a:t>12/8/21</a:t>
             </a:fld>
             <a:endParaRPr lang="en-US"/>
           </a:p>
@@ -872,7 +873,7 @@
           <a:p>
             <a:fld id="{9312FCB0-9AB7-410B-82F0-90816A8324F7}" type="datetimeFigureOut">
               <a:rPr lang="en-US" smtClean="0"/>
-              <a:t>12/7/2021</a:t>
+              <a:t>12/8/21</a:t>
             </a:fld>
             <a:endParaRPr lang="en-US"/>
           </a:p>
@@ -1147,7 +1148,7 @@
           <a:p>
             <a:fld id="{9312FCB0-9AB7-410B-82F0-90816A8324F7}" type="datetimeFigureOut">
               <a:rPr lang="en-US" smtClean="0"/>
-              <a:t>12/7/2021</a:t>
+              <a:t>12/8/21</a:t>
             </a:fld>
             <a:endParaRPr lang="en-US"/>
           </a:p>
@@ -1412,7 +1413,7 @@
           <a:p>
             <a:fld id="{9312FCB0-9AB7-410B-82F0-90816A8324F7}" type="datetimeFigureOut">
               <a:rPr lang="en-US" smtClean="0"/>
-              <a:t>12/7/2021</a:t>
+              <a:t>12/8/21</a:t>
             </a:fld>
             <a:endParaRPr lang="en-US"/>
           </a:p>
@@ -1824,7 +1825,7 @@
           <a:p>
             <a:fld id="{9312FCB0-9AB7-410B-82F0-90816A8324F7}" type="datetimeFigureOut">
               <a:rPr lang="en-US" smtClean="0"/>
-              <a:t>12/7/2021</a:t>
+              <a:t>12/8/21</a:t>
             </a:fld>
             <a:endParaRPr lang="en-US"/>
           </a:p>
@@ -1965,7 +1966,7 @@
           <a:p>
             <a:fld id="{9312FCB0-9AB7-410B-82F0-90816A8324F7}" type="datetimeFigureOut">
               <a:rPr lang="en-US" smtClean="0"/>
-              <a:t>12/7/2021</a:t>
+              <a:t>12/8/21</a:t>
             </a:fld>
             <a:endParaRPr lang="en-US"/>
           </a:p>
@@ -2078,7 +2079,7 @@
           <a:p>
             <a:fld id="{9312FCB0-9AB7-410B-82F0-90816A8324F7}" type="datetimeFigureOut">
               <a:rPr lang="en-US" smtClean="0"/>
-              <a:t>12/7/2021</a:t>
+              <a:t>12/8/21</a:t>
             </a:fld>
             <a:endParaRPr lang="en-US"/>
           </a:p>
@@ -2389,7 +2390,7 @@
           <a:p>
             <a:fld id="{9312FCB0-9AB7-410B-82F0-90816A8324F7}" type="datetimeFigureOut">
               <a:rPr lang="en-US" smtClean="0"/>
-              <a:t>12/7/2021</a:t>
+              <a:t>12/8/21</a:t>
             </a:fld>
             <a:endParaRPr lang="en-US"/>
           </a:p>
@@ -2677,7 +2678,7 @@
           <a:p>
             <a:fld id="{9312FCB0-9AB7-410B-82F0-90816A8324F7}" type="datetimeFigureOut">
               <a:rPr lang="en-US" smtClean="0"/>
-              <a:t>12/7/2021</a:t>
+              <a:t>12/8/21</a:t>
             </a:fld>
             <a:endParaRPr lang="en-US"/>
           </a:p>
@@ -2918,7 +2919,7 @@
           <a:p>
             <a:fld id="{9312FCB0-9AB7-410B-82F0-90816A8324F7}" type="datetimeFigureOut">
               <a:rPr lang="en-US" smtClean="0"/>
-              <a:t>12/7/2021</a:t>
+              <a:t>12/8/21</a:t>
             </a:fld>
             <a:endParaRPr lang="en-US"/>
           </a:p>
@@ -3889,6 +3890,98 @@
                 <a:latin typeface="Arial" panose="020B0604020202020204" pitchFamily="34" charset="0"/>
                 <a:cs typeface="Arial" panose="020B0604020202020204" pitchFamily="34" charset="0"/>
               </a:rPr>
+              <a:t>References. </a:t>
+            </a:r>
+            <a:endParaRPr lang="en-US" sz="2400" dirty="0">
+              <a:latin typeface="Arial" panose="020B0604020202020204" pitchFamily="34" charset="0"/>
+              <a:cs typeface="Arial" panose="020B0604020202020204" pitchFamily="34" charset="0"/>
+            </a:endParaRPr>
+          </a:p>
+        </p:txBody>
+      </p:sp>
+      <p:sp>
+        <p:nvSpPr>
+          <p:cNvPr id="3" name="Content Placeholder 2">
+            <a:extLst>
+              <a:ext uri="{FF2B5EF4-FFF2-40B4-BE49-F238E27FC236}">
+                <a16:creationId xmlns:a16="http://schemas.microsoft.com/office/drawing/2014/main" id="{9E42281A-11C2-467D-B1E9-F857FFF0E3FF}"/>
+              </a:ext>
+            </a:extLst>
+          </p:cNvPr>
+          <p:cNvSpPr>
+            <a:spLocks noGrp="1"/>
+          </p:cNvSpPr>
+          <p:nvPr>
+            <p:ph idx="1"/>
+          </p:nvPr>
+        </p:nvSpPr>
+        <p:spPr/>
+        <p:txBody>
+          <a:bodyPr/>
+          <a:lstStyle/>
+          <a:p>
+            <a:endParaRPr lang="en-US"/>
+          </a:p>
+        </p:txBody>
+      </p:sp>
+    </p:spTree>
+    <p:extLst>
+      <p:ext uri="{BB962C8B-B14F-4D97-AF65-F5344CB8AC3E}">
+        <p14:creationId xmlns:p14="http://schemas.microsoft.com/office/powerpoint/2010/main" val="1430573679"/>
+      </p:ext>
+    </p:extLst>
+  </p:cSld>
+  <p:clrMapOvr>
+    <a:masterClrMapping/>
+  </p:clrMapOvr>
+</p:sld>
+</file>
+
+<file path=ppt/slides/slide11.xml><?xml version="1.0" encoding="utf-8"?>
+<p:sld xmlns:a="http://schemas.openxmlformats.org/drawingml/2006/main" xmlns:r="http://schemas.openxmlformats.org/officeDocument/2006/relationships" xmlns:p="http://schemas.openxmlformats.org/presentationml/2006/main">
+  <p:cSld>
+    <p:spTree>
+      <p:nvGrpSpPr>
+        <p:cNvPr id="1" name=""/>
+        <p:cNvGrpSpPr/>
+        <p:nvPr/>
+      </p:nvGrpSpPr>
+      <p:grpSpPr>
+        <a:xfrm>
+          <a:off x="0" y="0"/>
+          <a:ext cx="0" cy="0"/>
+          <a:chOff x="0" y="0"/>
+          <a:chExt cx="0" cy="0"/>
+        </a:xfrm>
+      </p:grpSpPr>
+      <p:sp>
+        <p:nvSpPr>
+          <p:cNvPr id="2" name="Title 1">
+            <a:extLst>
+              <a:ext uri="{FF2B5EF4-FFF2-40B4-BE49-F238E27FC236}">
+                <a16:creationId xmlns:a16="http://schemas.microsoft.com/office/drawing/2014/main" id="{25B1398F-6C31-4D1D-9279-A6E8FE4D88B8}"/>
+              </a:ext>
+            </a:extLst>
+          </p:cNvPr>
+          <p:cNvSpPr>
+            <a:spLocks noGrp="1"/>
+          </p:cNvSpPr>
+          <p:nvPr>
+            <p:ph type="title"/>
+          </p:nvPr>
+        </p:nvSpPr>
+        <p:spPr/>
+        <p:txBody>
+          <a:bodyPr>
+            <a:normAutofit/>
+          </a:bodyPr>
+          <a:lstStyle/>
+          <a:p>
+            <a:r>
+              <a:rPr lang="en-GB" sz="2400" dirty="0">
+                <a:latin typeface="Arial" panose="020B0604020202020204" pitchFamily="34" charset="0"/>
+                <a:cs typeface="Arial" panose="020B0604020202020204" pitchFamily="34" charset="0"/>
+              </a:rPr>
               <a:t>TO DO LIST. Wednesday	</a:t>
             </a:r>
             <a:endParaRPr lang="en-US" sz="2400" dirty="0">
@@ -4028,7 +4121,7 @@
                 <a:latin typeface="Arial" panose="020B0604020202020204" pitchFamily="34" charset="0"/>
                 <a:cs typeface="Arial" panose="020B0604020202020204" pitchFamily="34" charset="0"/>
               </a:rPr>
-              <a:t>Discussion of Problem and identification of issues related to scalability. </a:t>
+              <a:t>Introduction</a:t>
             </a:r>
             <a:endParaRPr lang="en-US" sz="2400" dirty="0">
               <a:latin typeface="Arial" panose="020B0604020202020204" pitchFamily="34" charset="0"/>
@@ -4056,12 +4149,12 @@
         <p:spPr>
           <a:xfrm>
             <a:off x="838200" y="1253331"/>
-            <a:ext cx="10515600" cy="4351338"/>
+            <a:ext cx="10515600" cy="5239544"/>
           </a:xfrm>
         </p:spPr>
         <p:txBody>
           <a:bodyPr>
-            <a:normAutofit/>
+            <a:noAutofit/>
           </a:bodyPr>
           <a:lstStyle/>
           <a:p>
@@ -4069,8 +4162,8 @@
               <a:buNone/>
             </a:pPr>
             <a:r>
-              <a:rPr lang="en-GB" sz="1400" b="1" u="sng" dirty="0"/>
-              <a:t>Introduction</a:t>
+              <a:rPr lang="en-GB" sz="1600" b="1" u="sng" dirty="0"/>
+              <a:t>Cloud Native Development</a:t>
             </a:r>
           </a:p>
           <a:p>
@@ -4078,7 +4171,7 @@
               <a:buNone/>
             </a:pPr>
             <a:r>
-              <a:rPr lang="en-GB" sz="1400" dirty="0"/>
+              <a:rPr lang="en-GB" sz="1600" dirty="0"/>
               <a:t>Within this presentation I will be discussing in dept my solution submitted for the module “cloud native development”. I will discuss the problem, the proposed solution and identification of issues found related to scalability of the web application. At the end of the slide, there is a 5-minute video demonstration of the proposed solution being deployed to Microsoft Azure. Links to the web application can be found here: </a:t>
             </a:r>
           </a:p>
@@ -4087,24 +4180,24 @@
               <a:buNone/>
             </a:pPr>
             <a:r>
-              <a:rPr lang="en-GB" sz="1400" dirty="0"/>
+              <a:rPr lang="en-GB" sz="1600" dirty="0"/>
               <a:t>	Root Web Application: </a:t>
             </a:r>
             <a:r>
-              <a:rPr lang="en-GB" sz="1400" dirty="0">
+              <a:rPr lang="en-GB" sz="1600" dirty="0">
                 <a:hlinkClick r:id="rId2"/>
               </a:rPr>
               <a:t>https://www.google.com</a:t>
             </a:r>
-            <a:endParaRPr lang="en-GB" sz="1400" dirty="0"/>
+            <a:endParaRPr lang="en-GB" sz="1600" b="1" u="sng" dirty="0"/>
           </a:p>
           <a:p>
             <a:pPr marL="0" indent="0" algn="just">
               <a:buNone/>
             </a:pPr>
             <a:r>
-              <a:rPr lang="en-GB" sz="1400" b="1" u="sng" dirty="0"/>
-              <a:t>Problem</a:t>
+              <a:rPr lang="en-GB" sz="1600" dirty="0"/>
+              <a:t>As part of the module, I was asked to design and deploy a scalable social media sharing application similarly to Instagram where users will be able to authenticate and post media such as images and videos, write a caption for these media posts and then other users can comment under these posts. Basic Read Write Operations that are expected on such application are the four main Create, Update, Edit and Delete. This allows users to make post and then change or remove them after they have been created. </a:t>
             </a:r>
           </a:p>
           <a:p>
@@ -4112,8 +4205,8 @@
               <a:buNone/>
             </a:pPr>
             <a:r>
-              <a:rPr lang="en-GB" sz="1400" dirty="0"/>
-              <a:t>As part of the module, I was asked to design and deploy a scalable social media sharing application similarly to Instagram where users will be able to authenticate and post media such as images and videos, write a caption for these media posts and then other users can comment under these posts. Basic Read Write Operations that are expected on such application are the four main Create, Update, Edit and Delete. This allows users to make post and then change or remove them after they have been created. </a:t>
+              <a:rPr lang="en-GB" sz="1600" b="1" u="sng" dirty="0"/>
+              <a:t>Proposed Solution</a:t>
             </a:r>
           </a:p>
           <a:p>
@@ -4121,52 +4214,43 @@
               <a:buNone/>
             </a:pPr>
             <a:r>
-              <a:rPr lang="en-GB" sz="1400" b="1" u="sng" dirty="0"/>
-              <a:t>Proposed Solution</a:t>
+              <a:rPr lang="en-GB" sz="1600" dirty="0"/>
+              <a:t>For this solution, I have proposed that I use a cloud-based hosting provider and services, in this case I will be using Microsoft Azure and for scaling of the application I will be using features and services provided by Microsoft azure. The service which are used in this solution are the following: </a:t>
+            </a:r>
+            <a:r>
+              <a:rPr lang="en-GB" sz="1600" b="1" dirty="0"/>
+              <a:t>Azure App Service, Azure Logic Apps</a:t>
+            </a:r>
+            <a:r>
+              <a:rPr lang="en-GB" sz="1600" dirty="0"/>
+              <a:t>. (About 8 have been deployed), </a:t>
+            </a:r>
+            <a:r>
+              <a:rPr lang="en-GB" sz="1600" b="1" dirty="0"/>
+              <a:t>Azure Blob Storage, Azure SQL Database and an Azure CDN</a:t>
+            </a:r>
+            <a:r>
+              <a:rPr lang="en-GB" sz="1600" dirty="0"/>
+              <a:t> (Content Delivery Network). I will discuss in greater detail why I used these, the price of each service, the cost analysis of each service and how that service will aid in the scaling of the web application. I will also discuss any existing limitations of the developed solution and will discuss its ability to scale.	</a:t>
             </a:r>
           </a:p>
           <a:p>
             <a:pPr marL="0" indent="0" algn="just">
               <a:buNone/>
             </a:pPr>
-            <a:r>
-              <a:rPr lang="en-GB" sz="1400" dirty="0"/>
-              <a:t>For this solution, I have proposed that I use a cloud-based hosting provider and services, in this case I will be using Microsoft Azure and for scaling of the application I will be using features and services provided by Microsoft azure. The service which are used in this solution are the following: </a:t>
-            </a:r>
-            <a:r>
-              <a:rPr lang="en-GB" sz="1400" b="1" dirty="0"/>
-              <a:t>Azure App Service, Azure Logic Apps</a:t>
-            </a:r>
-            <a:r>
-              <a:rPr lang="en-GB" sz="1400" dirty="0"/>
-              <a:t>. (About 8 have been deployed), </a:t>
-            </a:r>
-            <a:r>
-              <a:rPr lang="en-GB" sz="1400" b="1" dirty="0"/>
-              <a:t>Azure Blob Storage, Azure SQL Database and an Azure CDN</a:t>
-            </a:r>
-            <a:r>
-              <a:rPr lang="en-GB" sz="1400" dirty="0"/>
-              <a:t> (Content Delivery Network). I will discuss in greater detail why I used these, the price of each service, the cost analysis of each service and how that service will aid in the scaling of the web application. I will also discuss any existing limitations of the developed solution and will discuss its ability to scale.	</a:t>
-            </a:r>
+            <a:endParaRPr lang="en-US" sz="1600" dirty="0"/>
           </a:p>
           <a:p>
             <a:pPr marL="0" indent="0" algn="just">
               <a:buNone/>
             </a:pPr>
-            <a:endParaRPr lang="en-US" sz="1200" dirty="0"/>
+            <a:endParaRPr lang="en-US" sz="1600" dirty="0"/>
           </a:p>
           <a:p>
             <a:pPr marL="0" indent="0" algn="just">
               <a:buNone/>
             </a:pPr>
-            <a:endParaRPr lang="en-US" sz="1200" dirty="0"/>
-          </a:p>
-          <a:p>
-            <a:pPr marL="0" indent="0" algn="just">
-              <a:buNone/>
-            </a:pPr>
-            <a:endParaRPr lang="en-US" sz="1200" dirty="0"/>
+            <a:endParaRPr lang="en-US" sz="1600" dirty="0"/>
           </a:p>
         </p:txBody>
       </p:sp>
@@ -4228,7 +4312,7 @@
                 <a:latin typeface="Arial" panose="020B0604020202020204" pitchFamily="34" charset="0"/>
                 <a:cs typeface="Arial" panose="020B0604020202020204" pitchFamily="34" charset="0"/>
               </a:rPr>
-              <a:t>Contents</a:t>
+              <a:t>Problem Identification and Scalability Issues </a:t>
             </a:r>
             <a:endParaRPr lang="en-US" sz="2400" dirty="0">
               <a:latin typeface="Arial" panose="020B0604020202020204" pitchFamily="34" charset="0"/>
@@ -4253,47 +4337,134 @@
             <p:ph idx="1"/>
           </p:nvPr>
         </p:nvSpPr>
-        <p:spPr/>
-        <p:txBody>
-          <a:bodyPr/>
-          <a:lstStyle/>
-          <a:p>
-            <a:r>
-              <a:rPr lang="en-GB" dirty="0"/>
-              <a:t>CND</a:t>
-            </a:r>
-          </a:p>
-          <a:p>
-            <a:r>
-              <a:rPr lang="en-GB" dirty="0"/>
-              <a:t>Static Web App</a:t>
-            </a:r>
-          </a:p>
-          <a:p>
-            <a:r>
-              <a:rPr lang="en-GB" dirty="0"/>
-              <a:t>Logic Apps</a:t>
-            </a:r>
-          </a:p>
-          <a:p>
-            <a:r>
-              <a:rPr lang="en-GB" dirty="0"/>
-              <a:t>Blob Storage</a:t>
-            </a:r>
-          </a:p>
-          <a:p>
-            <a:r>
-              <a:rPr lang="en-GB" dirty="0"/>
-              <a:t>Cosmos SQL DB</a:t>
-            </a:r>
-            <a:endParaRPr lang="en-US" dirty="0"/>
+        <p:spPr>
+          <a:xfrm>
+            <a:off x="838200" y="1253331"/>
+            <a:ext cx="10515600" cy="5239544"/>
+          </a:xfrm>
+        </p:spPr>
+        <p:txBody>
+          <a:bodyPr>
+            <a:noAutofit/>
+          </a:bodyPr>
+          <a:lstStyle/>
+          <a:p>
+            <a:pPr marL="0" indent="0" algn="just">
+              <a:buNone/>
+            </a:pPr>
+            <a:r>
+              <a:rPr lang="en-GB" sz="1600" b="1" u="sng" dirty="0"/>
+              <a:t>Problem linked to scalability</a:t>
+            </a:r>
+          </a:p>
+          <a:p>
+            <a:pPr marL="0" indent="0" algn="just">
+              <a:buNone/>
+            </a:pPr>
+            <a:r>
+              <a:rPr lang="en-GB" sz="1600" dirty="0"/>
+              <a:t>As part of this module, we have been asked to re create a social media sharing  web application, similarly to the likes of Instagram and Facebook, The key issue which has been identified is the ability to do the following in which allows </a:t>
+            </a:r>
+            <a:r>
+              <a:rPr lang="en-GB" sz="1600" b="1" dirty="0"/>
+              <a:t>multiple users to use the application asynchronously, Allow content to be uploaded, viewed by others and deleted on request. </a:t>
+            </a:r>
+            <a:r>
+              <a:rPr lang="en-GB" sz="1600" dirty="0"/>
+              <a:t>These issues are aspects of an existing full stack that can cause potential issues for users. </a:t>
+            </a:r>
+          </a:p>
+          <a:p>
+            <a:pPr marL="0" indent="0" algn="just">
+              <a:buNone/>
+            </a:pPr>
+            <a:r>
+              <a:rPr lang="en-GB" sz="1600" dirty="0"/>
+              <a:t>	For example. Without an appropriately configured </a:t>
+            </a:r>
+            <a:r>
+              <a:rPr lang="en-GB" sz="1600" b="1" dirty="0"/>
+              <a:t>load balancer</a:t>
+            </a:r>
+            <a:r>
+              <a:rPr lang="en-GB" sz="1600" dirty="0"/>
+              <a:t>, we could experience slow speeds and or response times of services or APIs (Application Programme Interfaces)  or in the worst use case: Total System Failure where the application has been dropped completely. A load balancer would evenly distribute the workloads and computing resources along multiple computers, networks and servers. </a:t>
+            </a:r>
+          </a:p>
+          <a:p>
+            <a:pPr marL="0" indent="0" algn="just">
+              <a:buNone/>
+            </a:pPr>
+            <a:r>
+              <a:rPr lang="en-GB" sz="1600" dirty="0"/>
+              <a:t>	Another Example would be the use and implementation of a </a:t>
+            </a:r>
+            <a:r>
+              <a:rPr lang="en-GB" sz="1600" b="1" dirty="0"/>
+              <a:t>CDN</a:t>
+            </a:r>
+            <a:r>
+              <a:rPr lang="en-GB" sz="1600" dirty="0"/>
+              <a:t> (Content Delivery Network). A CDN sits at the networks edge and provides features like </a:t>
+            </a:r>
+            <a:r>
+              <a:rPr lang="en-GB" sz="1600" b="1" dirty="0"/>
+              <a:t>caching</a:t>
+            </a:r>
+            <a:r>
+              <a:rPr lang="en-GB" sz="1600" dirty="0"/>
+              <a:t>, </a:t>
+            </a:r>
+            <a:r>
+              <a:rPr lang="en-GB" sz="1600" b="1" dirty="0"/>
+              <a:t>protection from cyber attacks</a:t>
+            </a:r>
+            <a:r>
+              <a:rPr lang="en-GB" sz="1600" dirty="0"/>
+              <a:t> such as DDOS (Direct Denial of Service) and it also provides a </a:t>
+            </a:r>
+            <a:r>
+              <a:rPr lang="en-GB" sz="1600" b="1" dirty="0"/>
+              <a:t>vast spread of geolocated servers </a:t>
+            </a:r>
+            <a:r>
+              <a:rPr lang="en-GB" sz="1600" dirty="0"/>
+              <a:t>placed round the globe. </a:t>
+            </a:r>
+          </a:p>
+          <a:p>
+            <a:pPr marL="0" indent="0" algn="just">
+              <a:buNone/>
+            </a:pPr>
+            <a:r>
+              <a:rPr lang="en-GB" sz="1600" b="1" dirty="0"/>
+              <a:t>	</a:t>
+            </a:r>
+          </a:p>
+          <a:p>
+            <a:pPr marL="0" indent="0" algn="just">
+              <a:buNone/>
+            </a:pPr>
+            <a:endParaRPr lang="en-US" sz="1600" dirty="0"/>
+          </a:p>
+          <a:p>
+            <a:pPr marL="0" indent="0" algn="just">
+              <a:buNone/>
+            </a:pPr>
+            <a:endParaRPr lang="en-US" sz="1600" dirty="0"/>
+          </a:p>
+          <a:p>
+            <a:pPr marL="0" indent="0" algn="just">
+              <a:buNone/>
+            </a:pPr>
+            <a:endParaRPr lang="en-US" sz="1600" dirty="0"/>
           </a:p>
         </p:txBody>
       </p:sp>
     </p:spTree>
     <p:extLst>
       <p:ext uri="{BB962C8B-B14F-4D97-AF65-F5344CB8AC3E}">
-        <p14:creationId xmlns:p14="http://schemas.microsoft.com/office/powerpoint/2010/main" val="3845529505"/>
+        <p14:creationId xmlns:p14="http://schemas.microsoft.com/office/powerpoint/2010/main" val="1178908564"/>
       </p:ext>
     </p:extLst>
   </p:cSld>
@@ -4348,7 +4519,7 @@
                 <a:latin typeface="Arial" panose="020B0604020202020204" pitchFamily="34" charset="0"/>
                 <a:cs typeface="Arial" panose="020B0604020202020204" pitchFamily="34" charset="0"/>
               </a:rPr>
-              <a:t>Overview of Technical Solution Developed. </a:t>
+              <a:t>Problem Identification and Scalability Issues </a:t>
             </a:r>
             <a:endParaRPr lang="en-US" sz="2400" dirty="0">
               <a:latin typeface="Arial" panose="020B0604020202020204" pitchFamily="34" charset="0"/>
@@ -4373,19 +4544,66 @@
             <p:ph idx="1"/>
           </p:nvPr>
         </p:nvSpPr>
-        <p:spPr/>
-        <p:txBody>
-          <a:bodyPr/>
-          <a:lstStyle/>
-          <a:p>
-            <a:endParaRPr lang="en-US"/>
+        <p:spPr>
+          <a:xfrm>
+            <a:off x="838200" y="1253331"/>
+            <a:ext cx="10515600" cy="5239544"/>
+          </a:xfrm>
+        </p:spPr>
+        <p:txBody>
+          <a:bodyPr>
+            <a:noAutofit/>
+          </a:bodyPr>
+          <a:lstStyle/>
+          <a:p>
+            <a:pPr marL="0" indent="0" algn="just">
+              <a:buNone/>
+            </a:pPr>
+            <a:r>
+              <a:rPr lang="en-GB" sz="1600" b="1" u="sng" dirty="0"/>
+              <a:t>Cloud Technologies</a:t>
+            </a:r>
+          </a:p>
+          <a:p>
+            <a:pPr marL="0" indent="0" algn="just">
+              <a:buNone/>
+            </a:pPr>
+            <a:r>
+              <a:rPr lang="en-GB" sz="1600" b="1" u="sng" dirty="0" err="1"/>
+              <a:t>Archutechual</a:t>
+            </a:r>
+            <a:r>
+              <a:rPr lang="en-GB" sz="1600" b="1" u="sng" dirty="0"/>
+              <a:t> components and </a:t>
+            </a:r>
+            <a:r>
+              <a:rPr lang="en-GB" sz="1600" b="1" u="sng" dirty="0" err="1"/>
+              <a:t>releated</a:t>
+            </a:r>
+            <a:r>
+              <a:rPr lang="en-GB" sz="1600" b="1" u="sng" dirty="0"/>
+              <a:t> patterns. </a:t>
+            </a:r>
+            <a:endParaRPr lang="en-US" sz="1600" dirty="0"/>
+          </a:p>
+          <a:p>
+            <a:pPr marL="0" indent="0" algn="just">
+              <a:buNone/>
+            </a:pPr>
+            <a:endParaRPr lang="en-US" sz="1600" dirty="0"/>
+          </a:p>
+          <a:p>
+            <a:pPr marL="0" indent="0" algn="just">
+              <a:buNone/>
+            </a:pPr>
+            <a:endParaRPr lang="en-US" sz="1600" dirty="0"/>
           </a:p>
         </p:txBody>
       </p:sp>
     </p:spTree>
     <p:extLst>
       <p:ext uri="{BB962C8B-B14F-4D97-AF65-F5344CB8AC3E}">
-        <p14:creationId xmlns:p14="http://schemas.microsoft.com/office/powerpoint/2010/main" val="2308423594"/>
+        <p14:creationId xmlns:p14="http://schemas.microsoft.com/office/powerpoint/2010/main" val="2133760490"/>
       </p:ext>
     </p:extLst>
   </p:cSld>
@@ -4440,7 +4658,7 @@
                 <a:latin typeface="Arial" panose="020B0604020202020204" pitchFamily="34" charset="0"/>
                 <a:cs typeface="Arial" panose="020B0604020202020204" pitchFamily="34" charset="0"/>
               </a:rPr>
-              <a:t>Advanced features within the developed solution. </a:t>
+              <a:t>Overview of Technical Solution Developed. </a:t>
             </a:r>
             <a:endParaRPr lang="en-US" sz="2400" dirty="0">
               <a:latin typeface="Arial" panose="020B0604020202020204" pitchFamily="34" charset="0"/>
@@ -4451,10 +4669,10 @@
       </p:sp>
       <p:sp>
         <p:nvSpPr>
-          <p:cNvPr id="3" name="Content Placeholder 2">
-            <a:extLst>
-              <a:ext uri="{FF2B5EF4-FFF2-40B4-BE49-F238E27FC236}">
-                <a16:creationId xmlns:a16="http://schemas.microsoft.com/office/drawing/2014/main" id="{9E42281A-11C2-467D-B1E9-F857FFF0E3FF}"/>
+          <p:cNvPr id="5" name="Content Placeholder 2">
+            <a:extLst>
+              <a:ext uri="{FF2B5EF4-FFF2-40B4-BE49-F238E27FC236}">
+                <a16:creationId xmlns:a16="http://schemas.microsoft.com/office/drawing/2014/main" id="{FFAB3445-0775-7D46-ACD2-6AA7B4654688}"/>
               </a:ext>
             </a:extLst>
           </p:cNvPr>
@@ -4465,35 +4683,148 @@
             <p:ph idx="1"/>
           </p:nvPr>
         </p:nvSpPr>
-        <p:spPr/>
-        <p:txBody>
-          <a:bodyPr/>
-          <a:lstStyle/>
-          <a:p>
-            <a:r>
-              <a:rPr lang="en-GB" dirty="0"/>
-              <a:t>Azure Static Web Apps</a:t>
-            </a:r>
-          </a:p>
-          <a:p>
-            <a:r>
-              <a:rPr lang="en-GB" dirty="0"/>
+        <p:spPr>
+          <a:xfrm>
+            <a:off x="838200" y="1253331"/>
+            <a:ext cx="10515600" cy="5239544"/>
+          </a:xfrm>
+        </p:spPr>
+        <p:txBody>
+          <a:bodyPr>
+            <a:noAutofit/>
+          </a:bodyPr>
+          <a:lstStyle/>
+          <a:p>
+            <a:pPr marL="0" indent="0" algn="just">
+              <a:buNone/>
+            </a:pPr>
+            <a:r>
+              <a:rPr lang="en-GB" sz="1600" b="1" u="sng" dirty="0"/>
+              <a:t>Azure App Service (Python Flask Application)</a:t>
+            </a:r>
+          </a:p>
+          <a:p>
+            <a:pPr marL="0" indent="0" algn="just">
+              <a:buNone/>
+            </a:pPr>
+            <a:r>
+              <a:rPr lang="en-GB" sz="1600" dirty="0"/>
+              <a:t>An Azure </a:t>
+            </a:r>
+          </a:p>
+          <a:p>
+            <a:pPr marL="0" indent="0" algn="just">
+              <a:buNone/>
+            </a:pPr>
+            <a:r>
+              <a:rPr lang="en-GB" sz="1600" b="1" u="sng" dirty="0"/>
+              <a:t>Azure Logic Apps</a:t>
+            </a:r>
+          </a:p>
+          <a:p>
+            <a:pPr marL="0" indent="0" algn="just">
+              <a:buNone/>
+            </a:pPr>
+            <a:r>
+              <a:rPr lang="en-GB" sz="1600" dirty="0"/>
+              <a:t>An Azure </a:t>
+            </a:r>
+            <a:endParaRPr lang="en-GB" sz="1600" b="1" u="sng" dirty="0"/>
+          </a:p>
+          <a:p>
+            <a:pPr marL="0" indent="0" algn="just">
+              <a:buNone/>
+            </a:pPr>
+            <a:r>
+              <a:rPr lang="en-GB" sz="1600" b="1" u="sng" dirty="0"/>
+              <a:t>Azure Storage Container</a:t>
+            </a:r>
+          </a:p>
+          <a:p>
+            <a:pPr marL="0" indent="0" algn="just">
+              <a:buNone/>
+            </a:pPr>
+            <a:r>
+              <a:rPr lang="en-GB" sz="1600" dirty="0"/>
+              <a:t>An Azure </a:t>
+            </a:r>
+            <a:endParaRPr lang="en-US" sz="1600" b="1" u="sng" dirty="0"/>
+          </a:p>
+          <a:p>
+            <a:pPr marL="0" indent="0" algn="just">
+              <a:buNone/>
+            </a:pPr>
+            <a:r>
+              <a:rPr lang="en-US" sz="1600" b="1" u="sng" dirty="0"/>
+              <a:t>Azure Cosmos SQL Database</a:t>
+            </a:r>
+          </a:p>
+          <a:p>
+            <a:pPr marL="0" indent="0" algn="just">
+              <a:buNone/>
+            </a:pPr>
+            <a:r>
+              <a:rPr lang="en-GB" sz="1600" dirty="0"/>
+              <a:t>An Azure </a:t>
+            </a:r>
+            <a:endParaRPr lang="en-US" sz="1600" b="1" u="sng" dirty="0"/>
+          </a:p>
+          <a:p>
+            <a:pPr marL="0" indent="0" algn="just">
+              <a:buNone/>
+            </a:pPr>
+            <a:r>
+              <a:rPr lang="en-US" sz="1600" b="1" u="sng" dirty="0"/>
               <a:t>Azure CDN (Content Delivery Network)</a:t>
             </a:r>
           </a:p>
           <a:p>
-            <a:r>
-              <a:rPr lang="en-GB" dirty="0"/>
-              <a:t>Azure Logic Apps (6 Total)</a:t>
-            </a:r>
-            <a:endParaRPr lang="en-US" dirty="0"/>
+            <a:pPr marL="0" indent="0" algn="just">
+              <a:buNone/>
+            </a:pPr>
+            <a:r>
+              <a:rPr lang="en-GB" sz="1600" dirty="0"/>
+              <a:t>An Azure </a:t>
+            </a:r>
+            <a:endParaRPr lang="en-US" sz="1600" b="1" u="sng" dirty="0"/>
+          </a:p>
+          <a:p>
+            <a:pPr marL="0" indent="0" algn="just">
+              <a:buNone/>
+            </a:pPr>
+            <a:r>
+              <a:rPr lang="en-US" sz="1600" b="1" u="sng" dirty="0"/>
+              <a:t>Azure Load Balancer</a:t>
+            </a:r>
+          </a:p>
+          <a:p>
+            <a:pPr marL="0" indent="0" algn="just">
+              <a:buNone/>
+            </a:pPr>
+            <a:r>
+              <a:rPr lang="en-GB" sz="1600" dirty="0"/>
+              <a:t>An Azure </a:t>
+            </a:r>
+            <a:endParaRPr lang="en-US" sz="1600" b="1" u="sng" dirty="0"/>
+          </a:p>
+          <a:p>
+            <a:pPr marL="0" indent="0" algn="just">
+              <a:buNone/>
+            </a:pPr>
+            <a:endParaRPr lang="en-US" sz="1600" b="1" u="sng" dirty="0"/>
+          </a:p>
+          <a:p>
+            <a:pPr marL="0" indent="0" algn="just">
+              <a:buNone/>
+            </a:pPr>
+            <a:endParaRPr lang="en-US" sz="1600" dirty="0"/>
           </a:p>
         </p:txBody>
       </p:sp>
     </p:spTree>
     <p:extLst>
       <p:ext uri="{BB962C8B-B14F-4D97-AF65-F5344CB8AC3E}">
-        <p14:creationId xmlns:p14="http://schemas.microsoft.com/office/powerpoint/2010/main" val="2427930033"/>
+        <p14:creationId xmlns:p14="http://schemas.microsoft.com/office/powerpoint/2010/main" val="2308423594"/>
       </p:ext>
     </p:extLst>
   </p:cSld>
@@ -4548,7 +4879,7 @@
                 <a:latin typeface="Arial" panose="020B0604020202020204" pitchFamily="34" charset="0"/>
                 <a:cs typeface="Arial" panose="020B0604020202020204" pitchFamily="34" charset="0"/>
               </a:rPr>
-              <a:t>Assessment of limitations and ability to scale. </a:t>
+              <a:t>Advanced features within the developed solution. </a:t>
             </a:r>
             <a:endParaRPr lang="en-US" sz="2400" dirty="0">
               <a:latin typeface="Arial" panose="020B0604020202020204" pitchFamily="34" charset="0"/>
@@ -4578,6 +4909,22 @@
           <a:bodyPr/>
           <a:lstStyle/>
           <a:p>
+            <a:r>
+              <a:rPr lang="en-GB" dirty="0"/>
+              <a:t>Azure Static Web Apps</a:t>
+            </a:r>
+          </a:p>
+          <a:p>
+            <a:r>
+              <a:rPr lang="en-GB" dirty="0"/>
+              <a:t>Azure CDN (Content Delivery Network)</a:t>
+            </a:r>
+          </a:p>
+          <a:p>
+            <a:r>
+              <a:rPr lang="en-GB" dirty="0"/>
+              <a:t>Azure Logic Apps (6 Total)</a:t>
+            </a:r>
             <a:endParaRPr lang="en-US" dirty="0"/>
           </a:p>
         </p:txBody>
@@ -4585,7 +4932,7 @@
     </p:spTree>
     <p:extLst>
       <p:ext uri="{BB962C8B-B14F-4D97-AF65-F5344CB8AC3E}">
-        <p14:creationId xmlns:p14="http://schemas.microsoft.com/office/powerpoint/2010/main" val="2809607033"/>
+        <p14:creationId xmlns:p14="http://schemas.microsoft.com/office/powerpoint/2010/main" val="2427930033"/>
       </p:ext>
     </p:extLst>
   </p:cSld>
@@ -4640,7 +4987,7 @@
                 <a:latin typeface="Arial" panose="020B0604020202020204" pitchFamily="34" charset="0"/>
                 <a:cs typeface="Arial" panose="020B0604020202020204" pitchFamily="34" charset="0"/>
               </a:rPr>
-              <a:t>Demonstration of developed Solution. </a:t>
+              <a:t>Assessment of limitations and ability to scale. </a:t>
             </a:r>
             <a:endParaRPr lang="en-US" sz="2400" dirty="0">
               <a:latin typeface="Arial" panose="020B0604020202020204" pitchFamily="34" charset="0"/>
@@ -4670,14 +5017,14 @@
           <a:bodyPr/>
           <a:lstStyle/>
           <a:p>
-            <a:endParaRPr lang="en-US"/>
+            <a:endParaRPr lang="en-US" dirty="0"/>
           </a:p>
         </p:txBody>
       </p:sp>
     </p:spTree>
     <p:extLst>
       <p:ext uri="{BB962C8B-B14F-4D97-AF65-F5344CB8AC3E}">
-        <p14:creationId xmlns:p14="http://schemas.microsoft.com/office/powerpoint/2010/main" val="539441051"/>
+        <p14:creationId xmlns:p14="http://schemas.microsoft.com/office/powerpoint/2010/main" val="2809607033"/>
       </p:ext>
     </p:extLst>
   </p:cSld>
@@ -4732,7 +5079,7 @@
                 <a:latin typeface="Arial" panose="020B0604020202020204" pitchFamily="34" charset="0"/>
                 <a:cs typeface="Arial" panose="020B0604020202020204" pitchFamily="34" charset="0"/>
               </a:rPr>
-              <a:t>Conclusion </a:t>
+              <a:t>Demonstration of developed Solution. </a:t>
             </a:r>
             <a:endParaRPr lang="en-US" sz="2400" dirty="0">
               <a:latin typeface="Arial" panose="020B0604020202020204" pitchFamily="34" charset="0"/>
@@ -4769,7 +5116,7 @@
     </p:spTree>
     <p:extLst>
       <p:ext uri="{BB962C8B-B14F-4D97-AF65-F5344CB8AC3E}">
-        <p14:creationId xmlns:p14="http://schemas.microsoft.com/office/powerpoint/2010/main" val="3619388521"/>
+        <p14:creationId xmlns:p14="http://schemas.microsoft.com/office/powerpoint/2010/main" val="539441051"/>
       </p:ext>
     </p:extLst>
   </p:cSld>
@@ -4824,7 +5171,7 @@
                 <a:latin typeface="Arial" panose="020B0604020202020204" pitchFamily="34" charset="0"/>
                 <a:cs typeface="Arial" panose="020B0604020202020204" pitchFamily="34" charset="0"/>
               </a:rPr>
-              <a:t>References. </a:t>
+              <a:t>Conclusion </a:t>
             </a:r>
             <a:endParaRPr lang="en-US" sz="2400" dirty="0">
               <a:latin typeface="Arial" panose="020B0604020202020204" pitchFamily="34" charset="0"/>
@@ -4861,7 +5208,7 @@
     </p:spTree>
     <p:extLst>
       <p:ext uri="{BB962C8B-B14F-4D97-AF65-F5344CB8AC3E}">
-        <p14:creationId xmlns:p14="http://schemas.microsoft.com/office/powerpoint/2010/main" val="1430573679"/>
+        <p14:creationId xmlns:p14="http://schemas.microsoft.com/office/powerpoint/2010/main" val="3619388521"/>
       </p:ext>
     </p:extLst>
   </p:cSld>

</xml_diff>